<commit_message>
Update README. Minor improvements to handling of data to make more consistent.
</commit_message>
<xml_diff>
--- a/doc/Managing SBOMs.pptx
+++ b/doc/Managing SBOMs.pptx
@@ -126,6 +126,11 @@
       </a:defRPr>
     </a:lvl9pPr>
   </p:defaultTextStyle>
+  <p:extLst>
+    <p:ext uri="{EFAFB233-063F-42B5-8137-9DF3F51BA10A}">
+      <p15:sldGuideLst xmlns:p15="http://schemas.microsoft.com/office/powerpoint/2012/main"/>
+    </p:ext>
+  </p:extLst>
 </p:presentation>
 </file>
 
@@ -211,7 +216,7 @@
           <a:p>
             <a:fld id="{65BF7558-FF5D-45E9-97D3-8C17CB73D2FD}" type="datetimeFigureOut">
               <a:rPr lang="en-GB" smtClean="0"/>
-              <a:t>28/12/2021</a:t>
+              <a:t>30/12/2021</a:t>
             </a:fld>
             <a:endParaRPr lang="en-GB"/>
           </a:p>
@@ -733,7 +738,7 @@
           <a:p>
             <a:fld id="{FF8BA7B0-CA1C-4F95-BAC9-B3093C6BF324}" type="datetime1">
               <a:rPr lang="en-US" smtClean="0"/>
-              <a:t>12/28/2021</a:t>
+              <a:t>12/30/2021</a:t>
             </a:fld>
             <a:endParaRPr lang="en-US" dirty="0"/>
           </a:p>
@@ -1005,7 +1010,7 @@
           <a:p>
             <a:fld id="{6805AE0B-BD48-46B6-B963-8532B7B3179D}" type="datetime1">
               <a:rPr lang="en-US" smtClean="0"/>
-              <a:t>12/28/2021</a:t>
+              <a:t>12/30/2021</a:t>
             </a:fld>
             <a:endParaRPr lang="en-US" dirty="0"/>
           </a:p>
@@ -1241,7 +1246,7 @@
           <a:p>
             <a:fld id="{5BCBDD59-2B7E-437B-86C3-1D3AA2FC7FFF}" type="datetime1">
               <a:rPr lang="en-US" smtClean="0"/>
-              <a:t>12/28/2021</a:t>
+              <a:t>12/30/2021</a:t>
             </a:fld>
             <a:endParaRPr lang="en-US" dirty="0"/>
           </a:p>
@@ -1556,7 +1561,7 @@
           <a:p>
             <a:fld id="{DD7CEE68-883C-43E1-B8A3-748FB26CAA4A}" type="datetime1">
               <a:rPr lang="en-US" smtClean="0"/>
-              <a:t>12/28/2021</a:t>
+              <a:t>12/30/2021</a:t>
             </a:fld>
             <a:endParaRPr lang="en-US" dirty="0"/>
           </a:p>
@@ -2034,7 +2039,7 @@
           <a:p>
             <a:fld id="{9706962C-DA17-4E25-9798-84DCB20390B2}" type="datetime1">
               <a:rPr lang="en-US" smtClean="0"/>
-              <a:t>12/28/2021</a:t>
+              <a:t>12/30/2021</a:t>
             </a:fld>
             <a:endParaRPr lang="en-US" dirty="0"/>
           </a:p>
@@ -2586,7 +2591,7 @@
           <a:p>
             <a:fld id="{99FDA655-91A9-4386-BEF7-E4D8C0744865}" type="datetime1">
               <a:rPr lang="en-US" smtClean="0"/>
-              <a:t>12/28/2021</a:t>
+              <a:t>12/30/2021</a:t>
             </a:fld>
             <a:endParaRPr lang="en-US" dirty="0"/>
           </a:p>
@@ -3365,7 +3370,7 @@
           <a:p>
             <a:fld id="{BE7E1BC2-095A-4D58-BB9A-007104F322FB}" type="datetime1">
               <a:rPr lang="en-US" smtClean="0"/>
-              <a:t>12/28/2021</a:t>
+              <a:t>12/30/2021</a:t>
             </a:fld>
             <a:endParaRPr lang="en-US" dirty="0"/>
           </a:p>
@@ -3545,7 +3550,7 @@
           <a:p>
             <a:fld id="{ACDB1312-D3F3-4AB9-8B40-DBD0C327A32E}" type="datetime1">
               <a:rPr lang="en-US" smtClean="0"/>
-              <a:t>12/28/2021</a:t>
+              <a:t>12/30/2021</a:t>
             </a:fld>
             <a:endParaRPr lang="en-US" dirty="0"/>
           </a:p>
@@ -3773,7 +3778,7 @@
           <a:p>
             <a:fld id="{C6A3A861-9BED-4EA8-9B8D-56D72059F536}" type="datetime1">
               <a:rPr lang="en-US" smtClean="0"/>
-              <a:t>12/28/2021</a:t>
+              <a:t>12/30/2021</a:t>
             </a:fld>
             <a:endParaRPr lang="en-US" dirty="0"/>
           </a:p>
@@ -3958,7 +3963,7 @@
           <a:p>
             <a:fld id="{28663D94-03DA-4334-B988-5C18E03DC747}" type="datetime1">
               <a:rPr lang="en-US" smtClean="0"/>
-              <a:t>12/28/2021</a:t>
+              <a:t>12/30/2021</a:t>
             </a:fld>
             <a:endParaRPr lang="en-US" dirty="0"/>
           </a:p>
@@ -4252,7 +4257,7 @@
           <a:p>
             <a:fld id="{63731F95-EF45-4406-997F-C5B4FF900F7F}" type="datetime1">
               <a:rPr lang="en-US" smtClean="0"/>
-              <a:t>12/28/2021</a:t>
+              <a:t>12/30/2021</a:t>
             </a:fld>
             <a:endParaRPr lang="en-US" dirty="0"/>
           </a:p>
@@ -4499,7 +4504,7 @@
           <a:p>
             <a:fld id="{5CD704CC-D563-44D0-987B-843CB78E11FE}" type="datetime1">
               <a:rPr lang="en-US" smtClean="0"/>
-              <a:t>12/28/2021</a:t>
+              <a:t>12/30/2021</a:t>
             </a:fld>
             <a:endParaRPr lang="en-US" dirty="0"/>
           </a:p>
@@ -4883,7 +4888,7 @@
           <a:p>
             <a:fld id="{7C2DC970-7787-4385-9658-FE10DA84C0C4}" type="datetime1">
               <a:rPr lang="en-US" smtClean="0"/>
-              <a:t>12/28/2021</a:t>
+              <a:t>12/30/2021</a:t>
             </a:fld>
             <a:endParaRPr lang="en-US" dirty="0"/>
           </a:p>
@@ -5006,7 +5011,7 @@
           <a:p>
             <a:fld id="{E0EA8102-A8C7-41BC-900A-ADE88AAA3ADC}" type="datetime1">
               <a:rPr lang="en-US" smtClean="0"/>
-              <a:t>12/28/2021</a:t>
+              <a:t>12/30/2021</a:t>
             </a:fld>
             <a:endParaRPr lang="en-US" dirty="0"/>
           </a:p>
@@ -5106,7 +5111,7 @@
           <a:p>
             <a:fld id="{67A66AF4-E742-4DF3-9380-A9B62E257226}" type="datetime1">
               <a:rPr lang="en-US" smtClean="0"/>
-              <a:t>12/28/2021</a:t>
+              <a:t>12/30/2021</a:t>
             </a:fld>
             <a:endParaRPr lang="en-US" dirty="0"/>
           </a:p>
@@ -5360,7 +5365,7 @@
           <a:p>
             <a:fld id="{48179394-92A1-488E-BBC3-05996EE10E41}" type="datetime1">
               <a:rPr lang="en-US" smtClean="0"/>
-              <a:t>12/28/2021</a:t>
+              <a:t>12/30/2021</a:t>
             </a:fld>
             <a:endParaRPr lang="en-US" dirty="0"/>
           </a:p>
@@ -5622,7 +5627,7 @@
           <a:p>
             <a:fld id="{5DB2DBD4-CDC4-47E9-A29A-2441711B8B88}" type="datetime1">
               <a:rPr lang="en-US" smtClean="0"/>
-              <a:t>12/28/2021</a:t>
+              <a:t>12/30/2021</a:t>
             </a:fld>
             <a:endParaRPr lang="en-US" dirty="0"/>
           </a:p>
@@ -5870,7 +5875,7 @@
           <a:p>
             <a:fld id="{B44AE377-3AEB-41C7-AEE6-489FBE66BBC5}" type="datetime1">
               <a:rPr lang="en-US" smtClean="0"/>
-              <a:t>12/28/2021</a:t>
+              <a:t>12/30/2021</a:t>
             </a:fld>
             <a:endParaRPr lang="en-US" dirty="0"/>
           </a:p>
@@ -6896,7 +6901,15 @@
             <a:pPr lvl="1"/>
             <a:r>
               <a:rPr lang="en-GB" dirty="0" smtClean="0"/>
-              <a:t>Initially RPM filename parsing supported</a:t>
+              <a:t>Initially </a:t>
+            </a:r>
+            <a:r>
+              <a:rPr lang="en-GB" dirty="0" smtClean="0"/>
+              <a:t>simple </a:t>
+            </a:r>
+            <a:r>
+              <a:rPr lang="en-GB" dirty="0" smtClean="0"/>
+              <a:t>filename parsing supported</a:t>
             </a:r>
           </a:p>
           <a:p>
@@ -6996,7 +7009,19 @@
           <a:p>
             <a:r>
               <a:rPr lang="en-GB" dirty="0" smtClean="0"/>
-              <a:t>STAIKA Setup</a:t>
+              <a:t>SBOM </a:t>
+            </a:r>
+            <a:r>
+              <a:rPr lang="en-GB" dirty="0" err="1" smtClean="0"/>
+              <a:t>MAnager</a:t>
+            </a:r>
+            <a:r>
+              <a:rPr lang="en-GB" dirty="0" smtClean="0"/>
+              <a:t> </a:t>
+            </a:r>
+            <a:r>
+              <a:rPr lang="en-GB" dirty="0" smtClean="0"/>
+              <a:t>Setup</a:t>
             </a:r>
             <a:endParaRPr lang="en-GB" dirty="0"/>
           </a:p>
@@ -7302,12 +7327,12 @@
           </a:p>
           <a:p>
             <a:r>
-              <a:rPr lang="en-GB" dirty="0" err="1" smtClean="0"/>
-              <a:t>Staika</a:t>
-            </a:r>
-            <a:r>
-              <a:rPr lang="en-GB" dirty="0" smtClean="0"/>
-              <a:t> –module &lt;xx&gt;</a:t>
+              <a:rPr lang="en-GB" dirty="0" smtClean="0"/>
+              <a:t>Python sbom.py </a:t>
+            </a:r>
+            <a:r>
+              <a:rPr lang="en-GB" dirty="0" smtClean="0"/>
+              <a:t>–module &lt;xx&gt;</a:t>
             </a:r>
             <a:endParaRPr lang="en-GB" dirty="0"/>
           </a:p>
@@ -7429,12 +7454,12 @@
           </a:p>
           <a:p>
             <a:r>
-              <a:rPr lang="en-GB" dirty="0" err="1" smtClean="0"/>
-              <a:t>Statika</a:t>
-            </a:r>
-            <a:r>
-              <a:rPr lang="en-GB" dirty="0" smtClean="0"/>
-              <a:t> –p &lt;project name&gt; -m &lt;product name&gt; | grep &lt;version&gt;</a:t>
+              <a:rPr lang="en-GB" dirty="0"/>
+              <a:t>Python sbom.py </a:t>
+            </a:r>
+            <a:r>
+              <a:rPr lang="en-GB" dirty="0" smtClean="0"/>
+              <a:t>–p &lt;project name&gt; -m &lt;product name&gt; | grep &lt;version&gt;</a:t>
             </a:r>
             <a:endParaRPr lang="en-GB" dirty="0"/>
           </a:p>
@@ -7559,12 +7584,12 @@
           </a:p>
           <a:p>
             <a:r>
-              <a:rPr lang="en-GB" dirty="0" err="1"/>
-              <a:t>Statika</a:t>
-            </a:r>
-            <a:r>
               <a:rPr lang="en-GB" dirty="0"/>
-              <a:t> –p &lt;project name&gt; -m &lt;product name</a:t>
+              <a:t>Python sbom.py </a:t>
+            </a:r>
+            <a:r>
+              <a:rPr lang="en-GB" dirty="0"/>
+              <a:t>–p &lt;project name&gt; -m &lt;product name</a:t>
             </a:r>
             <a:r>
               <a:rPr lang="en-GB" dirty="0" smtClean="0"/>
@@ -7687,12 +7712,12 @@
           </a:p>
           <a:p>
             <a:r>
-              <a:rPr lang="en-GB" dirty="0" err="1"/>
-              <a:t>Statika</a:t>
-            </a:r>
-            <a:r>
               <a:rPr lang="en-GB" dirty="0"/>
-              <a:t> –p &lt;project name&gt; </a:t>
+              <a:t>Python sbom.py </a:t>
+            </a:r>
+            <a:r>
+              <a:rPr lang="en-GB" dirty="0"/>
+              <a:t>–p &lt;project name&gt; </a:t>
             </a:r>
             <a:r>
               <a:rPr lang="en-GB" dirty="0" smtClean="0"/>
@@ -8872,7 +8897,11 @@
           <a:p>
             <a:r>
               <a:rPr lang="en-GB" dirty="0" smtClean="0"/>
-              <a:t>Introducing STATIKA </a:t>
+              <a:t>Introducing </a:t>
+            </a:r>
+            <a:r>
+              <a:rPr lang="en-GB" dirty="0" smtClean="0"/>
+              <a:t>SBOM-MANAGER</a:t>
             </a:r>
             <a:endParaRPr lang="en-GB" dirty="0"/>
           </a:p>

</xml_diff>